<commit_message>
versão final apresentacao 2 e codigo fonte
</commit_message>
<xml_diff>
--- a/MQTT – Parte 2.pptx
+++ b/MQTT – Parte 2.pptx
@@ -5,7 +5,7 @@
     <p:sldMasterId id="2147483672" r:id="rId1"/>
   </p:sldMasterIdLst>
   <p:notesMasterIdLst>
-    <p:notesMasterId r:id="rId14"/>
+    <p:notesMasterId r:id="rId16"/>
   </p:notesMasterIdLst>
   <p:sldIdLst>
     <p:sldId id="256" r:id="rId2"/>
@@ -19,7 +19,9 @@
     <p:sldId id="265" r:id="rId10"/>
     <p:sldId id="266" r:id="rId11"/>
     <p:sldId id="267" r:id="rId12"/>
-    <p:sldId id="257" r:id="rId13"/>
+    <p:sldId id="269" r:id="rId13"/>
+    <p:sldId id="268" r:id="rId14"/>
+    <p:sldId id="257" r:id="rId15"/>
   </p:sldIdLst>
   <p:sldSz cx="9144000" cy="6858000" type="screen4x3"/>
   <p:notesSz cx="6858000" cy="9144000"/>
@@ -203,7 +205,7 @@
           <a:p>
             <a:fld id="{BE561DE5-6CCE-443B-8495-9F383B497654}" type="datetimeFigureOut">
               <a:rPr lang="pt-BR" smtClean="0"/>
-              <a:t>20/09/2016</a:t>
+              <a:t>22/09/2016</a:t>
             </a:fld>
             <a:endParaRPr lang="pt-BR"/>
           </a:p>
@@ -659,7 +661,7 @@
           <a:p>
             <a:fld id="{EE3AB4C6-D6EC-4F33-B906-0B2DAA1C7ABF}" type="datetime1">
               <a:rPr lang="pt-BR" smtClean="0"/>
-              <a:t>20/09/2016</a:t>
+              <a:t>22/09/2016</a:t>
             </a:fld>
             <a:endParaRPr lang="pt-BR"/>
           </a:p>
@@ -863,7 +865,7 @@
           <a:p>
             <a:fld id="{078766F2-9FB6-4705-8787-9EFA3CD1C25A}" type="datetime1">
               <a:rPr lang="pt-BR" smtClean="0"/>
-              <a:t>20/09/2016</a:t>
+              <a:t>22/09/2016</a:t>
             </a:fld>
             <a:endParaRPr lang="pt-BR"/>
           </a:p>
@@ -1042,7 +1044,7 @@
           <a:p>
             <a:fld id="{14B940AF-4E90-4F31-973D-1A6B08874431}" type="datetime1">
               <a:rPr lang="pt-BR" smtClean="0"/>
-              <a:t>20/09/2016</a:t>
+              <a:t>22/09/2016</a:t>
             </a:fld>
             <a:endParaRPr lang="pt-BR"/>
           </a:p>
@@ -1211,7 +1213,7 @@
           <a:p>
             <a:fld id="{148A837C-CBA6-4A30-8745-406540285D66}" type="datetime1">
               <a:rPr lang="pt-BR" smtClean="0"/>
-              <a:t>20/09/2016</a:t>
+              <a:t>22/09/2016</a:t>
             </a:fld>
             <a:endParaRPr lang="pt-BR"/>
           </a:p>
@@ -1463,7 +1465,7 @@
           <a:p>
             <a:fld id="{179F36D5-60A9-4534-A262-587344E74369}" type="datetime1">
               <a:rPr lang="pt-BR" smtClean="0"/>
-              <a:t>20/09/2016</a:t>
+              <a:t>22/09/2016</a:t>
             </a:fld>
             <a:endParaRPr lang="pt-BR"/>
           </a:p>
@@ -1785,7 +1787,7 @@
           <a:p>
             <a:fld id="{F17813C2-0ACD-489D-B1F0-4C93AFED9504}" type="datetime1">
               <a:rPr lang="pt-BR" smtClean="0"/>
-              <a:t>20/09/2016</a:t>
+              <a:t>22/09/2016</a:t>
             </a:fld>
             <a:endParaRPr lang="pt-BR"/>
           </a:p>
@@ -2255,7 +2257,7 @@
           <a:p>
             <a:fld id="{8BDBEDE0-6F90-4DAC-99BA-A9487ECD7240}" type="datetime1">
               <a:rPr lang="pt-BR" smtClean="0"/>
-              <a:t>20/09/2016</a:t>
+              <a:t>22/09/2016</a:t>
             </a:fld>
             <a:endParaRPr lang="pt-BR"/>
           </a:p>
@@ -2407,7 +2409,7 @@
           <a:p>
             <a:fld id="{3618C3F9-425F-47B1-B2F4-BADB65AA729E}" type="datetime1">
               <a:rPr lang="pt-BR" smtClean="0"/>
-              <a:t>20/09/2016</a:t>
+              <a:t>22/09/2016</a:t>
             </a:fld>
             <a:endParaRPr lang="pt-BR"/>
           </a:p>
@@ -2501,7 +2503,7 @@
           <a:p>
             <a:fld id="{5F218B46-5110-40E0-B965-EB40A98DF2BB}" type="datetime1">
               <a:rPr lang="pt-BR" smtClean="0"/>
-              <a:t>20/09/2016</a:t>
+              <a:t>22/09/2016</a:t>
             </a:fld>
             <a:endParaRPr lang="pt-BR"/>
           </a:p>
@@ -2779,7 +2781,7 @@
           <a:p>
             <a:fld id="{362FAECF-A01D-4957-A174-7F3BD9531FA8}" type="datetime1">
               <a:rPr lang="pt-BR" smtClean="0"/>
-              <a:t>20/09/2016</a:t>
+              <a:t>22/09/2016</a:t>
             </a:fld>
             <a:endParaRPr lang="pt-BR"/>
           </a:p>
@@ -3088,7 +3090,7 @@
           <a:p>
             <a:fld id="{1CD7DFD8-8D3F-42CE-A9E3-4948635504A2}" type="datetime1">
               <a:rPr lang="pt-BR" smtClean="0"/>
-              <a:t>20/09/2016</a:t>
+              <a:t>22/09/2016</a:t>
             </a:fld>
             <a:endParaRPr lang="pt-BR"/>
           </a:p>
@@ -3390,7 +3392,7 @@
           <a:p>
             <a:fld id="{1F462BDA-3332-4A9C-B6BC-1AF23B42BA67}" type="datetime1">
               <a:rPr lang="pt-BR" smtClean="0"/>
-              <a:t>20/09/2016</a:t>
+              <a:t>22/09/2016</a:t>
             </a:fld>
             <a:endParaRPr lang="pt-BR"/>
           </a:p>
@@ -3894,6 +3896,13 @@
   <p:clrMapOvr>
     <a:masterClrMapping/>
   </p:clrMapOvr>
+  <p:timing>
+    <p:tnLst>
+      <p:par>
+        <p:cTn id="1" dur="indefinite" restart="never" nodeType="tmRoot"/>
+      </p:par>
+    </p:tnLst>
+  </p:timing>
 </p:sld>
 </file>
 
@@ -4057,6 +4066,13 @@
   <p:clrMapOvr>
     <a:masterClrMapping/>
   </p:clrMapOvr>
+  <p:timing>
+    <p:tnLst>
+      <p:par>
+        <p:cTn id="1" dur="indefinite" restart="never" nodeType="tmRoot"/>
+      </p:par>
+    </p:tnLst>
+  </p:timing>
 </p:sld>
 </file>
 
@@ -4104,111 +4120,6 @@
       </p:sp>
       <p:sp>
         <p:nvSpPr>
-          <p:cNvPr id="3" name="Content Placeholder 2"/>
-          <p:cNvSpPr>
-            <a:spLocks noGrp="1"/>
-          </p:cNvSpPr>
-          <p:nvPr>
-            <p:ph idx="1"/>
-          </p:nvPr>
-        </p:nvSpPr>
-        <p:spPr/>
-        <p:txBody>
-          <a:bodyPr/>
-          <a:lstStyle/>
-          <a:p>
-            <a:r>
-              <a:rPr lang="pt-BR" dirty="0" smtClean="0"/>
-              <a:t>Diversos tipos de clientes se comunicando</a:t>
-            </a:r>
-          </a:p>
-          <a:p>
-            <a:pPr lvl="1"/>
-            <a:r>
-              <a:rPr lang="pt-BR" dirty="0" smtClean="0"/>
-              <a:t>Sensores de temperatura</a:t>
-            </a:r>
-          </a:p>
-          <a:p>
-            <a:pPr lvl="1"/>
-            <a:r>
-              <a:rPr lang="pt-BR" dirty="0" smtClean="0"/>
-              <a:t>Monitor de temperaturas: apenas exibe as temperaturas recebidas</a:t>
-            </a:r>
-          </a:p>
-          <a:p>
-            <a:pPr lvl="1"/>
-            <a:r>
-              <a:rPr lang="pt-BR" dirty="0" smtClean="0"/>
-              <a:t>Sistema de análise e alertas: analisa os dados recebidos, emite alertas e controla os atuadores</a:t>
-            </a:r>
-          </a:p>
-          <a:p>
-            <a:pPr lvl="1"/>
-            <a:r>
-              <a:rPr lang="pt-BR" dirty="0" smtClean="0"/>
-              <a:t>Atuadores</a:t>
-            </a:r>
-            <a:endParaRPr lang="pt-BR" dirty="0"/>
-          </a:p>
-          <a:p>
-            <a:r>
-              <a:rPr lang="pt-BR" dirty="0" smtClean="0"/>
-              <a:t>Esse é um exemplo muito simples, poderíamos ter outros consumidores de dados como: </a:t>
-            </a:r>
-          </a:p>
-          <a:p>
-            <a:pPr lvl="1"/>
-            <a:r>
-              <a:rPr lang="pt-BR" dirty="0"/>
-              <a:t>U</a:t>
-            </a:r>
-            <a:r>
-              <a:rPr lang="pt-BR" dirty="0" smtClean="0"/>
-              <a:t>m </a:t>
-            </a:r>
-            <a:r>
-              <a:rPr lang="pt-BR" i="1" dirty="0" smtClean="0"/>
-              <a:t>dashboard </a:t>
-            </a:r>
-            <a:r>
-              <a:rPr lang="pt-BR" dirty="0" smtClean="0"/>
-              <a:t>web em tempo real (usando websockets)</a:t>
-            </a:r>
-          </a:p>
-          <a:p>
-            <a:pPr lvl="1"/>
-            <a:r>
-              <a:rPr lang="pt-BR" dirty="0" smtClean="0"/>
-              <a:t>Um consumidor para persistir as temperaturas em banco de dados</a:t>
-            </a:r>
-          </a:p>
-          <a:p>
-            <a:r>
-              <a:rPr lang="en-US" dirty="0" err="1" smtClean="0"/>
-              <a:t>Seria</a:t>
-            </a:r>
-            <a:r>
-              <a:rPr lang="en-US" dirty="0" smtClean="0"/>
-              <a:t> </a:t>
-            </a:r>
-            <a:r>
-              <a:rPr lang="en-US" dirty="0" err="1" smtClean="0"/>
-              <a:t>poss</a:t>
-            </a:r>
-            <a:r>
-              <a:rPr lang="pt-BR" dirty="0" smtClean="0"/>
-              <a:t>ível ainda coletar outros tipos de dados e usar sensores heterogêneos</a:t>
-            </a:r>
-          </a:p>
-          <a:p>
-            <a:pPr lvl="1"/>
-            <a:endParaRPr lang="pt-BR" i="1" dirty="0" smtClean="0"/>
-          </a:p>
-        </p:txBody>
-      </p:sp>
-      <p:sp>
-        <p:nvSpPr>
           <p:cNvPr id="4" name="Footer Placeholder 3"/>
           <p:cNvSpPr>
             <a:spLocks noGrp="1"/>
@@ -4253,6 +4164,470 @@
           </a:p>
         </p:txBody>
       </p:sp>
+      <p:sp>
+        <p:nvSpPr>
+          <p:cNvPr id="7" name="Oval 6"/>
+          <p:cNvSpPr/>
+          <p:nvPr/>
+        </p:nvSpPr>
+        <p:spPr>
+          <a:xfrm>
+            <a:off x="1643603" y="1849760"/>
+            <a:ext cx="1274440" cy="1274440"/>
+          </a:xfrm>
+          <a:prstGeom prst="ellipse">
+            <a:avLst/>
+          </a:prstGeom>
+        </p:spPr>
+        <p:style>
+          <a:lnRef idx="2">
+            <a:schemeClr val="dk1"/>
+          </a:lnRef>
+          <a:fillRef idx="1">
+            <a:schemeClr val="lt1"/>
+          </a:fillRef>
+          <a:effectRef idx="0">
+            <a:schemeClr val="dk1"/>
+          </a:effectRef>
+          <a:fontRef idx="minor">
+            <a:schemeClr val="dk1"/>
+          </a:fontRef>
+        </p:style>
+        <p:txBody>
+          <a:bodyPr rtlCol="0" anchor="ctr"/>
+          <a:lstStyle/>
+          <a:p>
+            <a:pPr algn="ctr"/>
+            <a:endParaRPr lang="pt-BR" dirty="0"/>
+          </a:p>
+        </p:txBody>
+      </p:sp>
+      <p:sp>
+        <p:nvSpPr>
+          <p:cNvPr id="14" name="Oval 13"/>
+          <p:cNvSpPr/>
+          <p:nvPr/>
+        </p:nvSpPr>
+        <p:spPr>
+          <a:xfrm>
+            <a:off x="1796003" y="2002160"/>
+            <a:ext cx="1274440" cy="1274440"/>
+          </a:xfrm>
+          <a:prstGeom prst="ellipse">
+            <a:avLst/>
+          </a:prstGeom>
+        </p:spPr>
+        <p:style>
+          <a:lnRef idx="2">
+            <a:schemeClr val="dk1"/>
+          </a:lnRef>
+          <a:fillRef idx="1">
+            <a:schemeClr val="lt1"/>
+          </a:fillRef>
+          <a:effectRef idx="0">
+            <a:schemeClr val="dk1"/>
+          </a:effectRef>
+          <a:fontRef idx="minor">
+            <a:schemeClr val="dk1"/>
+          </a:fontRef>
+        </p:style>
+        <p:txBody>
+          <a:bodyPr rtlCol="0" anchor="ctr"/>
+          <a:lstStyle/>
+          <a:p>
+            <a:pPr algn="ctr"/>
+            <a:endParaRPr lang="pt-BR" dirty="0"/>
+          </a:p>
+        </p:txBody>
+      </p:sp>
+      <p:sp>
+        <p:nvSpPr>
+          <p:cNvPr id="15" name="Oval 14"/>
+          <p:cNvSpPr/>
+          <p:nvPr/>
+        </p:nvSpPr>
+        <p:spPr>
+          <a:xfrm>
+            <a:off x="1948403" y="2154560"/>
+            <a:ext cx="1274440" cy="1274440"/>
+          </a:xfrm>
+          <a:prstGeom prst="ellipse">
+            <a:avLst/>
+          </a:prstGeom>
+        </p:spPr>
+        <p:style>
+          <a:lnRef idx="2">
+            <a:schemeClr val="dk1"/>
+          </a:lnRef>
+          <a:fillRef idx="1">
+            <a:schemeClr val="lt1"/>
+          </a:fillRef>
+          <a:effectRef idx="0">
+            <a:schemeClr val="dk1"/>
+          </a:effectRef>
+          <a:fontRef idx="minor">
+            <a:schemeClr val="dk1"/>
+          </a:fontRef>
+        </p:style>
+        <p:txBody>
+          <a:bodyPr rtlCol="0" anchor="ctr"/>
+          <a:lstStyle/>
+          <a:p>
+            <a:pPr algn="ctr"/>
+            <a:r>
+              <a:rPr lang="pt-BR" sz="1200" dirty="0" smtClean="0"/>
+              <a:t>Sensores</a:t>
+            </a:r>
+            <a:endParaRPr lang="pt-BR" sz="1200" dirty="0"/>
+          </a:p>
+        </p:txBody>
+      </p:sp>
+      <p:sp>
+        <p:nvSpPr>
+          <p:cNvPr id="16" name="Oval 15"/>
+          <p:cNvSpPr/>
+          <p:nvPr/>
+        </p:nvSpPr>
+        <p:spPr>
+          <a:xfrm>
+            <a:off x="1921941" y="4539023"/>
+            <a:ext cx="1274440" cy="1274440"/>
+          </a:xfrm>
+          <a:prstGeom prst="ellipse">
+            <a:avLst/>
+          </a:prstGeom>
+        </p:spPr>
+        <p:style>
+          <a:lnRef idx="2">
+            <a:schemeClr val="dk1"/>
+          </a:lnRef>
+          <a:fillRef idx="1">
+            <a:schemeClr val="lt1"/>
+          </a:fillRef>
+          <a:effectRef idx="0">
+            <a:schemeClr val="dk1"/>
+          </a:effectRef>
+          <a:fontRef idx="minor">
+            <a:schemeClr val="dk1"/>
+          </a:fontRef>
+        </p:style>
+        <p:txBody>
+          <a:bodyPr rtlCol="0" anchor="ctr"/>
+          <a:lstStyle/>
+          <a:p>
+            <a:pPr algn="ctr"/>
+            <a:r>
+              <a:rPr lang="pt-BR" sz="1200" dirty="0" smtClean="0"/>
+              <a:t>Atuadores</a:t>
+            </a:r>
+            <a:endParaRPr lang="pt-BR" sz="1200" dirty="0"/>
+          </a:p>
+        </p:txBody>
+      </p:sp>
+      <p:sp>
+        <p:nvSpPr>
+          <p:cNvPr id="17" name="Oval 16"/>
+          <p:cNvSpPr/>
+          <p:nvPr/>
+        </p:nvSpPr>
+        <p:spPr>
+          <a:xfrm>
+            <a:off x="6396286" y="1849760"/>
+            <a:ext cx="1274440" cy="1274440"/>
+          </a:xfrm>
+          <a:prstGeom prst="ellipse">
+            <a:avLst/>
+          </a:prstGeom>
+        </p:spPr>
+        <p:style>
+          <a:lnRef idx="2">
+            <a:schemeClr val="dk1"/>
+          </a:lnRef>
+          <a:fillRef idx="1">
+            <a:schemeClr val="lt1"/>
+          </a:fillRef>
+          <a:effectRef idx="0">
+            <a:schemeClr val="dk1"/>
+          </a:effectRef>
+          <a:fontRef idx="minor">
+            <a:schemeClr val="dk1"/>
+          </a:fontRef>
+        </p:style>
+        <p:txBody>
+          <a:bodyPr rtlCol="0" anchor="ctr"/>
+          <a:lstStyle/>
+          <a:p>
+            <a:pPr algn="ctr"/>
+            <a:r>
+              <a:rPr lang="pt-BR" sz="1600" dirty="0" smtClean="0"/>
+              <a:t>Monitor</a:t>
+            </a:r>
+            <a:endParaRPr lang="pt-BR" sz="1600" dirty="0"/>
+          </a:p>
+        </p:txBody>
+      </p:sp>
+      <p:sp>
+        <p:nvSpPr>
+          <p:cNvPr id="18" name="Oval 17"/>
+          <p:cNvSpPr/>
+          <p:nvPr/>
+        </p:nvSpPr>
+        <p:spPr>
+          <a:xfrm>
+            <a:off x="6660232" y="4725144"/>
+            <a:ext cx="1274440" cy="1274440"/>
+          </a:xfrm>
+          <a:prstGeom prst="ellipse">
+            <a:avLst/>
+          </a:prstGeom>
+        </p:spPr>
+        <p:style>
+          <a:lnRef idx="2">
+            <a:schemeClr val="dk1"/>
+          </a:lnRef>
+          <a:fillRef idx="1">
+            <a:schemeClr val="lt1"/>
+          </a:fillRef>
+          <a:effectRef idx="0">
+            <a:schemeClr val="dk1"/>
+          </a:effectRef>
+          <a:fontRef idx="minor">
+            <a:schemeClr val="dk1"/>
+          </a:fontRef>
+        </p:style>
+        <p:txBody>
+          <a:bodyPr rtlCol="0" anchor="ctr"/>
+          <a:lstStyle/>
+          <a:p>
+            <a:pPr algn="ctr"/>
+            <a:r>
+              <a:rPr lang="pt-BR" sz="1600" dirty="0" smtClean="0"/>
+              <a:t>Análise</a:t>
+            </a:r>
+            <a:endParaRPr lang="pt-BR" sz="1600" dirty="0"/>
+          </a:p>
+        </p:txBody>
+      </p:sp>
+      <p:sp>
+        <p:nvSpPr>
+          <p:cNvPr id="19" name="Oval 18"/>
+          <p:cNvSpPr/>
+          <p:nvPr/>
+        </p:nvSpPr>
+        <p:spPr>
+          <a:xfrm>
+            <a:off x="3995936" y="3234680"/>
+            <a:ext cx="1274440" cy="1274440"/>
+          </a:xfrm>
+          <a:prstGeom prst="ellipse">
+            <a:avLst/>
+          </a:prstGeom>
+        </p:spPr>
+        <p:style>
+          <a:lnRef idx="2">
+            <a:schemeClr val="dk1"/>
+          </a:lnRef>
+          <a:fillRef idx="1">
+            <a:schemeClr val="lt1"/>
+          </a:fillRef>
+          <a:effectRef idx="0">
+            <a:schemeClr val="dk1"/>
+          </a:effectRef>
+          <a:fontRef idx="minor">
+            <a:schemeClr val="dk1"/>
+          </a:fontRef>
+        </p:style>
+        <p:txBody>
+          <a:bodyPr rtlCol="0" anchor="ctr"/>
+          <a:lstStyle/>
+          <a:p>
+            <a:pPr algn="ctr"/>
+            <a:r>
+              <a:rPr lang="pt-BR" dirty="0" smtClean="0"/>
+              <a:t>Broker</a:t>
+            </a:r>
+            <a:endParaRPr lang="pt-BR" dirty="0"/>
+          </a:p>
+        </p:txBody>
+      </p:sp>
+      <p:cxnSp>
+        <p:nvCxnSpPr>
+          <p:cNvPr id="21" name="Straight Arrow Connector 20"/>
+          <p:cNvCxnSpPr>
+            <a:stCxn id="15" idx="6"/>
+            <a:endCxn id="19" idx="1"/>
+          </p:cNvCxnSpPr>
+          <p:nvPr/>
+        </p:nvCxnSpPr>
+        <p:spPr>
+          <a:xfrm>
+            <a:off x="3222843" y="2791780"/>
+            <a:ext cx="959730" cy="629537"/>
+          </a:xfrm>
+          <a:prstGeom prst="straightConnector1">
+            <a:avLst/>
+          </a:prstGeom>
+          <a:ln>
+            <a:tailEnd type="arrow"/>
+          </a:ln>
+        </p:spPr>
+        <p:style>
+          <a:lnRef idx="1">
+            <a:schemeClr val="accent1"/>
+          </a:lnRef>
+          <a:fillRef idx="0">
+            <a:schemeClr val="accent1"/>
+          </a:fillRef>
+          <a:effectRef idx="0">
+            <a:schemeClr val="accent1"/>
+          </a:effectRef>
+          <a:fontRef idx="minor">
+            <a:schemeClr val="tx1"/>
+          </a:fontRef>
+        </p:style>
+      </p:cxnSp>
+      <p:cxnSp>
+        <p:nvCxnSpPr>
+          <p:cNvPr id="23" name="Straight Arrow Connector 22"/>
+          <p:cNvCxnSpPr>
+            <a:stCxn id="19" idx="3"/>
+            <a:endCxn id="16" idx="6"/>
+          </p:cNvCxnSpPr>
+          <p:nvPr/>
+        </p:nvCxnSpPr>
+        <p:spPr>
+          <a:xfrm flipH="1">
+            <a:off x="3196381" y="4322483"/>
+            <a:ext cx="986192" cy="853760"/>
+          </a:xfrm>
+          <a:prstGeom prst="straightConnector1">
+            <a:avLst/>
+          </a:prstGeom>
+          <a:ln>
+            <a:tailEnd type="arrow"/>
+          </a:ln>
+        </p:spPr>
+        <p:style>
+          <a:lnRef idx="1">
+            <a:schemeClr val="accent1"/>
+          </a:lnRef>
+          <a:fillRef idx="0">
+            <a:schemeClr val="accent1"/>
+          </a:fillRef>
+          <a:effectRef idx="0">
+            <a:schemeClr val="accent1"/>
+          </a:effectRef>
+          <a:fontRef idx="minor">
+            <a:schemeClr val="tx1"/>
+          </a:fontRef>
+        </p:style>
+      </p:cxnSp>
+      <p:cxnSp>
+        <p:nvCxnSpPr>
+          <p:cNvPr id="25" name="Straight Arrow Connector 24"/>
+          <p:cNvCxnSpPr>
+            <a:endCxn id="18" idx="1"/>
+          </p:cNvCxnSpPr>
+          <p:nvPr/>
+        </p:nvCxnSpPr>
+        <p:spPr>
+          <a:xfrm>
+            <a:off x="5270376" y="4149080"/>
+            <a:ext cx="1576493" cy="762701"/>
+          </a:xfrm>
+          <a:prstGeom prst="straightConnector1">
+            <a:avLst/>
+          </a:prstGeom>
+          <a:ln>
+            <a:tailEnd type="arrow"/>
+          </a:ln>
+        </p:spPr>
+        <p:style>
+          <a:lnRef idx="1">
+            <a:schemeClr val="accent1"/>
+          </a:lnRef>
+          <a:fillRef idx="0">
+            <a:schemeClr val="accent1"/>
+          </a:fillRef>
+          <a:effectRef idx="0">
+            <a:schemeClr val="accent1"/>
+          </a:effectRef>
+          <a:fontRef idx="minor">
+            <a:schemeClr val="tx1"/>
+          </a:fontRef>
+        </p:style>
+      </p:cxnSp>
+      <p:cxnSp>
+        <p:nvCxnSpPr>
+          <p:cNvPr id="27" name="Straight Arrow Connector 26"/>
+          <p:cNvCxnSpPr>
+            <a:endCxn id="19" idx="5"/>
+          </p:cNvCxnSpPr>
+          <p:nvPr/>
+        </p:nvCxnSpPr>
+        <p:spPr>
+          <a:xfrm flipH="1" flipV="1">
+            <a:off x="5083739" y="4322483"/>
+            <a:ext cx="1576493" cy="823857"/>
+          </a:xfrm>
+          <a:prstGeom prst="straightConnector1">
+            <a:avLst/>
+          </a:prstGeom>
+          <a:ln>
+            <a:tailEnd type="arrow"/>
+          </a:ln>
+        </p:spPr>
+        <p:style>
+          <a:lnRef idx="1">
+            <a:schemeClr val="accent1"/>
+          </a:lnRef>
+          <a:fillRef idx="0">
+            <a:schemeClr val="accent1"/>
+          </a:fillRef>
+          <a:effectRef idx="0">
+            <a:schemeClr val="accent1"/>
+          </a:effectRef>
+          <a:fontRef idx="minor">
+            <a:schemeClr val="tx1"/>
+          </a:fontRef>
+        </p:style>
+      </p:cxnSp>
+      <p:cxnSp>
+        <p:nvCxnSpPr>
+          <p:cNvPr id="31" name="Straight Arrow Connector 30"/>
+          <p:cNvCxnSpPr>
+            <a:stCxn id="19" idx="7"/>
+            <a:endCxn id="17" idx="2"/>
+          </p:cNvCxnSpPr>
+          <p:nvPr/>
+        </p:nvCxnSpPr>
+        <p:spPr>
+          <a:xfrm flipV="1">
+            <a:off x="5083739" y="2486980"/>
+            <a:ext cx="1312547" cy="934337"/>
+          </a:xfrm>
+          <a:prstGeom prst="straightConnector1">
+            <a:avLst/>
+          </a:prstGeom>
+          <a:ln>
+            <a:tailEnd type="arrow"/>
+          </a:ln>
+        </p:spPr>
+        <p:style>
+          <a:lnRef idx="1">
+            <a:schemeClr val="accent1"/>
+          </a:lnRef>
+          <a:fillRef idx="0">
+            <a:schemeClr val="accent1"/>
+          </a:fillRef>
+          <a:effectRef idx="0">
+            <a:schemeClr val="accent1"/>
+          </a:effectRef>
+          <a:fontRef idx="minor">
+            <a:schemeClr val="tx1"/>
+          </a:fontRef>
+        </p:style>
+      </p:cxnSp>
     </p:spTree>
     <p:extLst>
       <p:ext uri="{BB962C8B-B14F-4D97-AF65-F5344CB8AC3E}">
@@ -4263,6 +4638,13 @@
   <p:clrMapOvr>
     <a:masterClrMapping/>
   </p:clrMapOvr>
+  <p:timing>
+    <p:tnLst>
+      <p:par>
+        <p:cTn id="1" dur="indefinite" restart="never" nodeType="tmRoot"/>
+      </p:par>
+    </p:tnLst>
+  </p:timing>
 </p:sld>
 </file>
 
@@ -4295,6 +4677,353 @@
         </p:nvSpPr>
         <p:spPr/>
         <p:txBody>
+          <a:bodyPr>
+            <a:normAutofit fontScale="90000"/>
+          </a:bodyPr>
+          <a:lstStyle/>
+          <a:p>
+            <a:r>
+              <a:rPr lang="pt-BR" dirty="0" smtClean="0"/>
+              <a:t>Demonstração de exemplo – Simulação de incêndio</a:t>
+            </a:r>
+            <a:endParaRPr lang="pt-BR" dirty="0"/>
+          </a:p>
+        </p:txBody>
+      </p:sp>
+      <p:sp>
+        <p:nvSpPr>
+          <p:cNvPr id="3" name="Content Placeholder 2"/>
+          <p:cNvSpPr>
+            <a:spLocks noGrp="1"/>
+          </p:cNvSpPr>
+          <p:nvPr>
+            <p:ph idx="1"/>
+          </p:nvPr>
+        </p:nvSpPr>
+        <p:spPr/>
+        <p:txBody>
+          <a:bodyPr/>
+          <a:lstStyle/>
+          <a:p>
+            <a:r>
+              <a:rPr lang="pt-BR" dirty="0" smtClean="0"/>
+              <a:t>Diversos tipos de clientes se comunicando</a:t>
+            </a:r>
+          </a:p>
+          <a:p>
+            <a:pPr lvl="1"/>
+            <a:r>
+              <a:rPr lang="pt-BR" dirty="0" smtClean="0"/>
+              <a:t>Sensores de temperatura</a:t>
+            </a:r>
+          </a:p>
+          <a:p>
+            <a:pPr lvl="1"/>
+            <a:r>
+              <a:rPr lang="pt-BR" dirty="0" smtClean="0"/>
+              <a:t>Monitor de temperaturas: apenas exibe as temperaturas recebidas</a:t>
+            </a:r>
+          </a:p>
+          <a:p>
+            <a:pPr lvl="1"/>
+            <a:r>
+              <a:rPr lang="pt-BR" dirty="0" smtClean="0"/>
+              <a:t>Sistema de análise e alertas: analisa os dados recebidos, emite alertas e controla os atuadores</a:t>
+            </a:r>
+          </a:p>
+          <a:p>
+            <a:pPr lvl="1"/>
+            <a:r>
+              <a:rPr lang="pt-BR" dirty="0" smtClean="0"/>
+              <a:t>Atuadores</a:t>
+            </a:r>
+            <a:endParaRPr lang="pt-BR" dirty="0"/>
+          </a:p>
+          <a:p>
+            <a:r>
+              <a:rPr lang="pt-BR" dirty="0" smtClean="0"/>
+              <a:t>Esse é um exemplo muito simples, poderíamos ter outros consumidores de dados como: </a:t>
+            </a:r>
+          </a:p>
+          <a:p>
+            <a:pPr lvl="1"/>
+            <a:r>
+              <a:rPr lang="pt-BR" dirty="0"/>
+              <a:t>U</a:t>
+            </a:r>
+            <a:r>
+              <a:rPr lang="pt-BR" dirty="0" smtClean="0"/>
+              <a:t>m </a:t>
+            </a:r>
+            <a:r>
+              <a:rPr lang="pt-BR" i="1" dirty="0" smtClean="0"/>
+              <a:t>dashboard </a:t>
+            </a:r>
+            <a:r>
+              <a:rPr lang="pt-BR" dirty="0" smtClean="0"/>
+              <a:t>web em tempo real (usando websockets)</a:t>
+            </a:r>
+          </a:p>
+          <a:p>
+            <a:pPr lvl="1"/>
+            <a:r>
+              <a:rPr lang="pt-BR" dirty="0" smtClean="0"/>
+              <a:t>Um consumidor para persistir as temperaturas em banco de dados</a:t>
+            </a:r>
+          </a:p>
+          <a:p>
+            <a:r>
+              <a:rPr lang="en-US" dirty="0" err="1" smtClean="0"/>
+              <a:t>Seria</a:t>
+            </a:r>
+            <a:r>
+              <a:rPr lang="en-US" dirty="0" smtClean="0"/>
+              <a:t> </a:t>
+            </a:r>
+            <a:r>
+              <a:rPr lang="en-US" dirty="0" err="1" smtClean="0"/>
+              <a:t>poss</a:t>
+            </a:r>
+            <a:r>
+              <a:rPr lang="pt-BR" dirty="0" smtClean="0"/>
+              <a:t>ível ainda coletar outros tipos de dados e usar sensores </a:t>
+            </a:r>
+            <a:r>
+              <a:rPr lang="pt-BR" dirty="0" smtClean="0"/>
+              <a:t>heterogêneos</a:t>
+            </a:r>
+            <a:endParaRPr lang="pt-BR" dirty="0" smtClean="0"/>
+          </a:p>
+          <a:p>
+            <a:pPr lvl="1"/>
+            <a:endParaRPr lang="pt-BR" i="1" dirty="0" smtClean="0"/>
+          </a:p>
+        </p:txBody>
+      </p:sp>
+      <p:sp>
+        <p:nvSpPr>
+          <p:cNvPr id="4" name="Footer Placeholder 3"/>
+          <p:cNvSpPr>
+            <a:spLocks noGrp="1"/>
+          </p:cNvSpPr>
+          <p:nvPr>
+            <p:ph type="ftr" sz="quarter" idx="11"/>
+          </p:nvPr>
+        </p:nvSpPr>
+        <p:spPr/>
+        <p:txBody>
+          <a:bodyPr/>
+          <a:lstStyle/>
+          <a:p>
+            <a:r>
+              <a:rPr lang="pt-BR" smtClean="0"/>
+              <a:t>Pedro Affonso - MQTT - Parte 2</a:t>
+            </a:r>
+            <a:endParaRPr lang="pt-BR"/>
+          </a:p>
+        </p:txBody>
+      </p:sp>
+      <p:sp>
+        <p:nvSpPr>
+          <p:cNvPr id="5" name="Slide Number Placeholder 4"/>
+          <p:cNvSpPr>
+            <a:spLocks noGrp="1"/>
+          </p:cNvSpPr>
+          <p:nvPr>
+            <p:ph type="sldNum" sz="quarter" idx="12"/>
+          </p:nvPr>
+        </p:nvSpPr>
+        <p:spPr/>
+        <p:txBody>
+          <a:bodyPr/>
+          <a:lstStyle/>
+          <a:p>
+            <a:fld id="{605E5792-B4AB-4CBF-9540-1CEF96787920}" type="slidenum">
+              <a:rPr lang="pt-BR" smtClean="0"/>
+              <a:t>12</a:t>
+            </a:fld>
+            <a:endParaRPr lang="pt-BR"/>
+          </a:p>
+        </p:txBody>
+      </p:sp>
+    </p:spTree>
+    <p:extLst>
+      <p:ext uri="{BB962C8B-B14F-4D97-AF65-F5344CB8AC3E}">
+        <p14:creationId xmlns:p14="http://schemas.microsoft.com/office/powerpoint/2010/main" val="829169049"/>
+      </p:ext>
+    </p:extLst>
+  </p:cSld>
+  <p:clrMapOvr>
+    <a:masterClrMapping/>
+  </p:clrMapOvr>
+  <p:timing>
+    <p:tnLst>
+      <p:par>
+        <p:cTn id="1" dur="indefinite" restart="never" nodeType="tmRoot"/>
+      </p:par>
+    </p:tnLst>
+  </p:timing>
+</p:sld>
+</file>
+
+<file path=ppt/slides/slide13.xml><?xml version="1.0" encoding="utf-8"?>
+<p:sld xmlns:a="http://schemas.openxmlformats.org/drawingml/2006/main" xmlns:r="http://schemas.openxmlformats.org/officeDocument/2006/relationships" xmlns:p="http://schemas.openxmlformats.org/presentationml/2006/main">
+  <p:cSld>
+    <p:spTree>
+      <p:nvGrpSpPr>
+        <p:cNvPr id="1" name=""/>
+        <p:cNvGrpSpPr/>
+        <p:nvPr/>
+      </p:nvGrpSpPr>
+      <p:grpSpPr>
+        <a:xfrm>
+          <a:off x="0" y="0"/>
+          <a:ext cx="0" cy="0"/>
+          <a:chOff x="0" y="0"/>
+          <a:chExt cx="0" cy="0"/>
+        </a:xfrm>
+      </p:grpSpPr>
+      <p:sp>
+        <p:nvSpPr>
+          <p:cNvPr id="2" name="Title 1"/>
+          <p:cNvSpPr>
+            <a:spLocks noGrp="1"/>
+          </p:cNvSpPr>
+          <p:nvPr>
+            <p:ph type="title"/>
+          </p:nvPr>
+        </p:nvSpPr>
+        <p:spPr/>
+        <p:txBody>
+          <a:bodyPr/>
+          <a:lstStyle/>
+          <a:p>
+            <a:r>
+              <a:rPr lang="pt-BR" dirty="0" smtClean="0"/>
+              <a:t>Dúvidas?</a:t>
+            </a:r>
+            <a:endParaRPr lang="pt-BR" dirty="0"/>
+          </a:p>
+        </p:txBody>
+      </p:sp>
+      <p:sp>
+        <p:nvSpPr>
+          <p:cNvPr id="3" name="Content Placeholder 2"/>
+          <p:cNvSpPr>
+            <a:spLocks noGrp="1"/>
+          </p:cNvSpPr>
+          <p:nvPr>
+            <p:ph idx="1"/>
+          </p:nvPr>
+        </p:nvSpPr>
+        <p:spPr/>
+        <p:txBody>
+          <a:bodyPr/>
+          <a:lstStyle/>
+          <a:p>
+            <a:r>
+              <a:rPr lang="pt-BR" dirty="0" smtClean="0"/>
+              <a:t>Obrigado!</a:t>
+            </a:r>
+            <a:endParaRPr lang="pt-BR" dirty="0"/>
+          </a:p>
+        </p:txBody>
+      </p:sp>
+      <p:sp>
+        <p:nvSpPr>
+          <p:cNvPr id="4" name="Footer Placeholder 3"/>
+          <p:cNvSpPr>
+            <a:spLocks noGrp="1"/>
+          </p:cNvSpPr>
+          <p:nvPr>
+            <p:ph type="ftr" sz="quarter" idx="11"/>
+          </p:nvPr>
+        </p:nvSpPr>
+        <p:spPr/>
+        <p:txBody>
+          <a:bodyPr/>
+          <a:lstStyle/>
+          <a:p>
+            <a:r>
+              <a:rPr lang="pt-BR" smtClean="0"/>
+              <a:t>Pedro Affonso - MQTT - Parte 2</a:t>
+            </a:r>
+            <a:endParaRPr lang="pt-BR"/>
+          </a:p>
+        </p:txBody>
+      </p:sp>
+      <p:sp>
+        <p:nvSpPr>
+          <p:cNvPr id="5" name="Slide Number Placeholder 4"/>
+          <p:cNvSpPr>
+            <a:spLocks noGrp="1"/>
+          </p:cNvSpPr>
+          <p:nvPr>
+            <p:ph type="sldNum" sz="quarter" idx="12"/>
+          </p:nvPr>
+        </p:nvSpPr>
+        <p:spPr/>
+        <p:txBody>
+          <a:bodyPr/>
+          <a:lstStyle/>
+          <a:p>
+            <a:fld id="{605E5792-B4AB-4CBF-9540-1CEF96787920}" type="slidenum">
+              <a:rPr lang="pt-BR" smtClean="0"/>
+              <a:t>13</a:t>
+            </a:fld>
+            <a:endParaRPr lang="pt-BR"/>
+          </a:p>
+        </p:txBody>
+      </p:sp>
+    </p:spTree>
+    <p:extLst>
+      <p:ext uri="{BB962C8B-B14F-4D97-AF65-F5344CB8AC3E}">
+        <p14:creationId xmlns:p14="http://schemas.microsoft.com/office/powerpoint/2010/main" val="339616410"/>
+      </p:ext>
+    </p:extLst>
+  </p:cSld>
+  <p:clrMapOvr>
+    <a:masterClrMapping/>
+  </p:clrMapOvr>
+  <p:timing>
+    <p:tnLst>
+      <p:par>
+        <p:cTn id="1" dur="indefinite" restart="never" nodeType="tmRoot"/>
+      </p:par>
+    </p:tnLst>
+  </p:timing>
+</p:sld>
+</file>
+
+<file path=ppt/slides/slide14.xml><?xml version="1.0" encoding="utf-8"?>
+<p:sld xmlns:a="http://schemas.openxmlformats.org/drawingml/2006/main" xmlns:r="http://schemas.openxmlformats.org/officeDocument/2006/relationships" xmlns:p="http://schemas.openxmlformats.org/presentationml/2006/main">
+  <p:cSld>
+    <p:spTree>
+      <p:nvGrpSpPr>
+        <p:cNvPr id="1" name=""/>
+        <p:cNvGrpSpPr/>
+        <p:nvPr/>
+      </p:nvGrpSpPr>
+      <p:grpSpPr>
+        <a:xfrm>
+          <a:off x="0" y="0"/>
+          <a:ext cx="0" cy="0"/>
+          <a:chOff x="0" y="0"/>
+          <a:chExt cx="0" cy="0"/>
+        </a:xfrm>
+      </p:grpSpPr>
+      <p:sp>
+        <p:nvSpPr>
+          <p:cNvPr id="2" name="Title 1"/>
+          <p:cNvSpPr>
+            <a:spLocks noGrp="1"/>
+          </p:cNvSpPr>
+          <p:nvPr>
+            <p:ph type="title"/>
+          </p:nvPr>
+        </p:nvSpPr>
+        <p:spPr/>
+        <p:txBody>
           <a:bodyPr/>
           <a:lstStyle/>
           <a:p>
@@ -4406,7 +5135,7 @@
           <a:p>
             <a:fld id="{605E5792-B4AB-4CBF-9540-1CEF96787920}" type="slidenum">
               <a:rPr lang="pt-BR" smtClean="0"/>
-              <a:t>12</a:t>
+              <a:t>14</a:t>
             </a:fld>
             <a:endParaRPr lang="pt-BR"/>
           </a:p>
@@ -4488,7 +5217,42 @@
           <a:p>
             <a:r>
               <a:rPr lang="pt-BR" dirty="0" smtClean="0"/>
-              <a:t>Demonstração de aplicação</a:t>
+              <a:t>MQTT-SN</a:t>
+            </a:r>
+          </a:p>
+          <a:p>
+            <a:r>
+              <a:rPr lang="pt-BR" dirty="0" smtClean="0"/>
+              <a:t>Diferenças entre MQTT e MQTT-SN</a:t>
+            </a:r>
+          </a:p>
+          <a:p>
+            <a:r>
+              <a:rPr lang="pt-BR" dirty="0" smtClean="0"/>
+              <a:t>Arquitetura</a:t>
+            </a:r>
+          </a:p>
+          <a:p>
+            <a:r>
+              <a:rPr lang="pt-BR" dirty="0" smtClean="0"/>
+              <a:t>Detalhamento de algumas diferenças do MQTT-SN</a:t>
+            </a:r>
+            <a:endParaRPr lang="pt-BR" dirty="0" smtClean="0"/>
+          </a:p>
+          <a:p>
+            <a:r>
+              <a:rPr lang="pt-BR" dirty="0" smtClean="0"/>
+              <a:t>Demonstração de </a:t>
+            </a:r>
+            <a:r>
+              <a:rPr lang="pt-BR" dirty="0" smtClean="0"/>
+              <a:t>aplicação</a:t>
+            </a:r>
+          </a:p>
+          <a:p>
+            <a:r>
+              <a:rPr lang="pt-BR" dirty="0" smtClean="0"/>
+              <a:t>Referências</a:t>
             </a:r>
             <a:endParaRPr lang="pt-BR" dirty="0"/>
           </a:p>
@@ -4550,6 +5314,13 @@
   <p:clrMapOvr>
     <a:masterClrMapping/>
   </p:clrMapOvr>
+  <p:timing>
+    <p:tnLst>
+      <p:par>
+        <p:cTn id="1" dur="indefinite" restart="never" nodeType="tmRoot"/>
+      </p:par>
+    </p:tnLst>
+  </p:timing>
 </p:sld>
 </file>
 
@@ -4622,22 +5393,36 @@
           <a:p>
             <a:r>
               <a:rPr lang="pt-BR" dirty="0" smtClean="0"/>
-              <a:t>Muito adequado para IoT</a:t>
-            </a:r>
-          </a:p>
-          <a:p>
+              <a:t>Muito adequado para </a:t>
+            </a:r>
+            <a:r>
+              <a:rPr lang="pt-BR" dirty="0" smtClean="0"/>
+              <a:t>IoT</a:t>
+            </a:r>
+          </a:p>
+          <a:p>
+            <a:r>
+              <a:rPr lang="pt-BR" dirty="0" smtClean="0"/>
+              <a:t>Assim como o MQTT:</a:t>
+            </a:r>
+            <a:endParaRPr lang="pt-BR" dirty="0" smtClean="0"/>
+          </a:p>
+          <a:p>
+            <a:pPr lvl="1"/>
             <a:r>
               <a:rPr lang="pt-BR" dirty="0" smtClean="0"/>
               <a:t>Permite a um SA manter comunicação com diversas aplicações usando poucos recursos</a:t>
             </a:r>
           </a:p>
           <a:p>
+            <a:pPr lvl="1"/>
             <a:r>
               <a:rPr lang="pt-BR" dirty="0" smtClean="0"/>
               <a:t>Muitas vezes não se tem interesse nos endereços dos dispositivos, mas apenas no conteúdo da mensagem</a:t>
             </a:r>
           </a:p>
           <a:p>
+            <a:pPr lvl="1"/>
             <a:r>
               <a:rPr lang="pt-BR" dirty="0" smtClean="0"/>
               <a:t>Nós e enlaces podem falhar; Gerenciar endereços pode ser muito difícil</a:t>
@@ -4702,6 +5487,13 @@
   <p:clrMapOvr>
     <a:masterClrMapping/>
   </p:clrMapOvr>
+  <p:timing>
+    <p:tnLst>
+      <p:par>
+        <p:cTn id="1" dur="indefinite" restart="never" nodeType="tmRoot"/>
+      </p:par>
+    </p:tnLst>
+  </p:timing>
 </p:sld>
 </file>
 
@@ -4739,7 +5531,7 @@
           <a:p>
             <a:r>
               <a:rPr lang="pt-BR" dirty="0" smtClean="0"/>
-              <a:t>MQTT x MQTT-SN</a:t>
+              <a:t>MQTT-SN</a:t>
             </a:r>
             <a:endParaRPr lang="pt-BR" dirty="0"/>
           </a:p>
@@ -4865,6 +5657,13 @@
   <p:clrMapOvr>
     <a:masterClrMapping/>
   </p:clrMapOvr>
+  <p:timing>
+    <p:tnLst>
+      <p:par>
+        <p:cTn id="1" dur="indefinite" restart="never" nodeType="tmRoot"/>
+      </p:par>
+    </p:tnLst>
+  </p:timing>
 </p:sld>
 </file>
 
@@ -4900,7 +5699,11 @@
           <a:bodyPr/>
           <a:lstStyle/>
           <a:p>
-            <a:endParaRPr lang="pt-BR"/>
+            <a:r>
+              <a:rPr lang="pt-BR" dirty="0" smtClean="0"/>
+              <a:t>MQTT x MQTT-SN</a:t>
+            </a:r>
+            <a:endParaRPr lang="pt-BR" dirty="0"/>
           </a:p>
         </p:txBody>
       </p:sp>
@@ -4940,8 +5743,23 @@
           <a:p>
             <a:r>
               <a:rPr lang="pt-BR" dirty="0" smtClean="0"/>
-              <a:t>Nomes curtos e ids pré-definidos</a:t>
-            </a:r>
+              <a:t>Nomes </a:t>
+            </a:r>
+            <a:r>
+              <a:rPr lang="pt-BR" dirty="0" smtClean="0"/>
+              <a:t>de tópico curtos </a:t>
+            </a:r>
+          </a:p>
+          <a:p>
+            <a:r>
+              <a:rPr lang="pt-BR" dirty="0" smtClean="0"/>
+              <a:t>IDs </a:t>
+            </a:r>
+            <a:r>
+              <a:rPr lang="pt-BR" dirty="0" smtClean="0"/>
+              <a:t>pré-definidos</a:t>
+            </a:r>
+            <a:endParaRPr lang="pt-BR" dirty="0" smtClean="0"/>
           </a:p>
           <a:p>
             <a:r>
@@ -5019,6 +5837,13 @@
   <p:clrMapOvr>
     <a:masterClrMapping/>
   </p:clrMapOvr>
+  <p:timing>
+    <p:tnLst>
+      <p:par>
+        <p:cTn id="1" dur="indefinite" restart="never" nodeType="tmRoot"/>
+      </p:par>
+    </p:tnLst>
+  </p:timing>
 </p:sld>
 </file>
 
@@ -5221,6 +6046,13 @@
   <p:clrMapOvr>
     <a:masterClrMapping/>
   </p:clrMapOvr>
+  <p:timing>
+    <p:tnLst>
+      <p:par>
+        <p:cTn id="1" dur="indefinite" restart="never" nodeType="tmRoot"/>
+      </p:par>
+    </p:tnLst>
+  </p:timing>
 </p:sld>
 </file>
 
@@ -5389,6 +6221,13 @@
   <p:clrMapOvr>
     <a:masterClrMapping/>
   </p:clrMapOvr>
+  <p:timing>
+    <p:tnLst>
+      <p:par>
+        <p:cTn id="1" dur="indefinite" restart="never" nodeType="tmRoot"/>
+      </p:par>
+    </p:tnLst>
+  </p:timing>
 </p:sld>
 </file>
 
@@ -5687,6 +6526,13 @@
   <p:clrMapOvr>
     <a:masterClrMapping/>
   </p:clrMapOvr>
+  <p:timing>
+    <p:tnLst>
+      <p:par>
+        <p:cTn id="1" dur="indefinite" restart="never" nodeType="tmRoot"/>
+      </p:par>
+    </p:tnLst>
+  </p:timing>
 </p:sld>
 </file>
 
@@ -5869,6 +6715,13 @@
   <p:clrMapOvr>
     <a:masterClrMapping/>
   </p:clrMapOvr>
+  <p:timing>
+    <p:tnLst>
+      <p:par>
+        <p:cTn id="1" dur="indefinite" restart="never" nodeType="tmRoot"/>
+      </p:par>
+    </p:tnLst>
+  </p:timing>
 </p:sld>
 </file>
 

</xml_diff>